<commit_message>
Interim Report. Plus corrected guide's name
</commit_message>
<xml_diff>
--- a/Vehicle Loan Default Prediction.pptx
+++ b/Vehicle Loan Default Prediction.pptx
@@ -233,7 +233,7 @@
           <a:p>
             <a:fld id="{CA38C360-1451-4FAC-96AE-AED9435A5117}" type="datetimeFigureOut">
               <a:rPr lang="en-US" smtClean="0"/>
-              <a:t>1/9/2020</a:t>
+              <a:t>1/10/2020</a:t>
             </a:fld>
             <a:endParaRPr lang="en-US"/>
           </a:p>
@@ -679,7 +679,7 @@
           <a:p>
             <a:fld id="{A2D47140-E761-4776-BB05-B90A68E34D64}" type="datetimeFigureOut">
               <a:rPr lang="en-US" smtClean="0"/>
-              <a:t>1/9/2020</a:t>
+              <a:t>1/10/2020</a:t>
             </a:fld>
             <a:endParaRPr lang="en-US"/>
           </a:p>
@@ -847,7 +847,7 @@
           <a:p>
             <a:fld id="{A2D47140-E761-4776-BB05-B90A68E34D64}" type="datetimeFigureOut">
               <a:rPr lang="en-US" smtClean="0"/>
-              <a:t>1/9/2020</a:t>
+              <a:t>1/10/2020</a:t>
             </a:fld>
             <a:endParaRPr lang="en-US"/>
           </a:p>
@@ -1025,7 +1025,7 @@
           <a:p>
             <a:fld id="{A2D47140-E761-4776-BB05-B90A68E34D64}" type="datetimeFigureOut">
               <a:rPr lang="en-US" smtClean="0"/>
-              <a:t>1/9/2020</a:t>
+              <a:t>1/10/2020</a:t>
             </a:fld>
             <a:endParaRPr lang="en-US"/>
           </a:p>
@@ -1193,7 +1193,7 @@
           <a:p>
             <a:fld id="{A2D47140-E761-4776-BB05-B90A68E34D64}" type="datetimeFigureOut">
               <a:rPr lang="en-US" smtClean="0"/>
-              <a:t>1/9/2020</a:t>
+              <a:t>1/10/2020</a:t>
             </a:fld>
             <a:endParaRPr lang="en-US"/>
           </a:p>
@@ -1438,7 +1438,7 @@
           <a:p>
             <a:fld id="{A2D47140-E761-4776-BB05-B90A68E34D64}" type="datetimeFigureOut">
               <a:rPr lang="en-US" smtClean="0"/>
-              <a:t>1/9/2020</a:t>
+              <a:t>1/10/2020</a:t>
             </a:fld>
             <a:endParaRPr lang="en-US"/>
           </a:p>
@@ -1723,7 +1723,7 @@
           <a:p>
             <a:fld id="{A2D47140-E761-4776-BB05-B90A68E34D64}" type="datetimeFigureOut">
               <a:rPr lang="en-US" smtClean="0"/>
-              <a:t>1/9/2020</a:t>
+              <a:t>1/10/2020</a:t>
             </a:fld>
             <a:endParaRPr lang="en-US"/>
           </a:p>
@@ -2142,7 +2142,7 @@
           <a:p>
             <a:fld id="{A2D47140-E761-4776-BB05-B90A68E34D64}" type="datetimeFigureOut">
               <a:rPr lang="en-US" smtClean="0"/>
-              <a:t>1/9/2020</a:t>
+              <a:t>1/10/2020</a:t>
             </a:fld>
             <a:endParaRPr lang="en-US"/>
           </a:p>
@@ -2259,7 +2259,7 @@
           <a:p>
             <a:fld id="{A2D47140-E761-4776-BB05-B90A68E34D64}" type="datetimeFigureOut">
               <a:rPr lang="en-US" smtClean="0"/>
-              <a:t>1/9/2020</a:t>
+              <a:t>1/10/2020</a:t>
             </a:fld>
             <a:endParaRPr lang="en-US"/>
           </a:p>
@@ -2354,7 +2354,7 @@
           <a:p>
             <a:fld id="{A2D47140-E761-4776-BB05-B90A68E34D64}" type="datetimeFigureOut">
               <a:rPr lang="en-US" smtClean="0"/>
-              <a:t>1/9/2020</a:t>
+              <a:t>1/10/2020</a:t>
             </a:fld>
             <a:endParaRPr lang="en-US"/>
           </a:p>
@@ -2629,7 +2629,7 @@
           <a:p>
             <a:fld id="{A2D47140-E761-4776-BB05-B90A68E34D64}" type="datetimeFigureOut">
               <a:rPr lang="en-US" smtClean="0"/>
-              <a:t>1/9/2020</a:t>
+              <a:t>1/10/2020</a:t>
             </a:fld>
             <a:endParaRPr lang="en-US"/>
           </a:p>
@@ -2881,7 +2881,7 @@
           <a:p>
             <a:fld id="{A2D47140-E761-4776-BB05-B90A68E34D64}" type="datetimeFigureOut">
               <a:rPr lang="en-US" smtClean="0"/>
-              <a:t>1/9/2020</a:t>
+              <a:t>1/10/2020</a:t>
             </a:fld>
             <a:endParaRPr lang="en-US"/>
           </a:p>
@@ -3092,7 +3092,7 @@
           <a:p>
             <a:fld id="{A2D47140-E761-4776-BB05-B90A68E34D64}" type="datetimeFigureOut">
               <a:rPr lang="en-US" smtClean="0"/>
-              <a:t>1/9/2020</a:t>
+              <a:t>1/10/2020</a:t>
             </a:fld>
             <a:endParaRPr lang="en-US"/>
           </a:p>
@@ -3953,20 +3953,12 @@
               <a:t>Animesh</a:t>
             </a:r>
             <a:r>
-              <a:rPr lang="en-US" sz="2000" dirty="0">
+              <a:rPr lang="en-US" sz="2000">
                 <a:solidFill>
                   <a:srgbClr val="FF0000"/>
                 </a:solidFill>
               </a:rPr>
-              <a:t> </a:t>
-            </a:r>
-            <a:r>
-              <a:rPr lang="en-US" sz="2000" dirty="0" err="1">
-                <a:solidFill>
-                  <a:srgbClr val="FF0000"/>
-                </a:solidFill>
-              </a:rPr>
-              <a:t>Tiweri</a:t>
+              <a:t> Tiwari</a:t>
             </a:r>
             <a:endParaRPr lang="en-US" sz="2000" dirty="0">
               <a:solidFill>

</xml_diff>